<commit_message>
updated WA arch with names
</commit_message>
<xml_diff>
--- a/papers/lctes/diagrams.pptx
+++ b/papers/lctes/diagrams.pptx
@@ -130,10 +130,6 @@
 </p:cmAuthorLst>
 </file>
 
-<file path=ppt/revisionInfo.xml><?xml version="1.0" encoding="utf-8"?>
-<p1510:revInfo xmlns:a="http://schemas.openxmlformats.org/drawingml/2006/main" xmlns:r="http://schemas.openxmlformats.org/officeDocument/2006/relationships" xmlns:p1510="http://schemas.microsoft.com/office/powerpoint/2015/10/main"/>
-</file>
-
 <file path=ppt/notesMasters/notesMaster1.xml><?xml version="1.0" encoding="utf-8"?>
 <p:notesMaster xmlns:a="http://schemas.openxmlformats.org/drawingml/2006/main" xmlns:r="http://schemas.openxmlformats.org/officeDocument/2006/relationships" xmlns:p="http://schemas.openxmlformats.org/presentationml/2006/main">
   <p:cSld>
@@ -216,7 +212,7 @@
           <a:p>
             <a:fld id="{C0237B04-0BFF-4188-AE10-E77C3C5257C8}" type="datetimeFigureOut">
               <a:rPr lang="en-US" smtClean="0"/>
-              <a:t>11/17/2017</a:t>
+              <a:t>2/23/18</a:t>
             </a:fld>
             <a:endParaRPr lang="en-US"/>
           </a:p>
@@ -888,7 +884,7 @@
           <a:p>
             <a:fld id="{E504D85E-2087-4C48-BE7E-1A197735EA07}" type="datetimeFigureOut">
               <a:rPr lang="en-US" smtClean="0"/>
-              <a:t>11/17/2017</a:t>
+              <a:t>2/23/18</a:t>
             </a:fld>
             <a:endParaRPr lang="en-US"/>
           </a:p>
@@ -1086,7 +1082,7 @@
           <a:p>
             <a:fld id="{E504D85E-2087-4C48-BE7E-1A197735EA07}" type="datetimeFigureOut">
               <a:rPr lang="en-US" smtClean="0"/>
-              <a:t>11/17/2017</a:t>
+              <a:t>2/23/18</a:t>
             </a:fld>
             <a:endParaRPr lang="en-US"/>
           </a:p>
@@ -1294,7 +1290,7 @@
           <a:p>
             <a:fld id="{E504D85E-2087-4C48-BE7E-1A197735EA07}" type="datetimeFigureOut">
               <a:rPr lang="en-US" smtClean="0"/>
-              <a:t>11/17/2017</a:t>
+              <a:t>2/23/18</a:t>
             </a:fld>
             <a:endParaRPr lang="en-US"/>
           </a:p>
@@ -1492,7 +1488,7 @@
           <a:p>
             <a:fld id="{E504D85E-2087-4C48-BE7E-1A197735EA07}" type="datetimeFigureOut">
               <a:rPr lang="en-US" smtClean="0"/>
-              <a:t>11/17/2017</a:t>
+              <a:t>2/23/18</a:t>
             </a:fld>
             <a:endParaRPr lang="en-US"/>
           </a:p>
@@ -1767,7 +1763,7 @@
           <a:p>
             <a:fld id="{E504D85E-2087-4C48-BE7E-1A197735EA07}" type="datetimeFigureOut">
               <a:rPr lang="en-US" smtClean="0"/>
-              <a:t>11/17/2017</a:t>
+              <a:t>2/23/18</a:t>
             </a:fld>
             <a:endParaRPr lang="en-US"/>
           </a:p>
@@ -2032,7 +2028,7 @@
           <a:p>
             <a:fld id="{E504D85E-2087-4C48-BE7E-1A197735EA07}" type="datetimeFigureOut">
               <a:rPr lang="en-US" smtClean="0"/>
-              <a:t>11/17/2017</a:t>
+              <a:t>2/23/18</a:t>
             </a:fld>
             <a:endParaRPr lang="en-US"/>
           </a:p>
@@ -2444,7 +2440,7 @@
           <a:p>
             <a:fld id="{E504D85E-2087-4C48-BE7E-1A197735EA07}" type="datetimeFigureOut">
               <a:rPr lang="en-US" smtClean="0"/>
-              <a:t>11/17/2017</a:t>
+              <a:t>2/23/18</a:t>
             </a:fld>
             <a:endParaRPr lang="en-US"/>
           </a:p>
@@ -2585,7 +2581,7 @@
           <a:p>
             <a:fld id="{E504D85E-2087-4C48-BE7E-1A197735EA07}" type="datetimeFigureOut">
               <a:rPr lang="en-US" smtClean="0"/>
-              <a:t>11/17/2017</a:t>
+              <a:t>2/23/18</a:t>
             </a:fld>
             <a:endParaRPr lang="en-US"/>
           </a:p>
@@ -2698,7 +2694,7 @@
           <a:p>
             <a:fld id="{E504D85E-2087-4C48-BE7E-1A197735EA07}" type="datetimeFigureOut">
               <a:rPr lang="en-US" smtClean="0"/>
-              <a:t>11/17/2017</a:t>
+              <a:t>2/23/18</a:t>
             </a:fld>
             <a:endParaRPr lang="en-US"/>
           </a:p>
@@ -3009,7 +3005,7 @@
           <a:p>
             <a:fld id="{E504D85E-2087-4C48-BE7E-1A197735EA07}" type="datetimeFigureOut">
               <a:rPr lang="en-US" smtClean="0"/>
-              <a:t>11/17/2017</a:t>
+              <a:t>2/23/18</a:t>
             </a:fld>
             <a:endParaRPr lang="en-US"/>
           </a:p>
@@ -3297,7 +3293,7 @@
           <a:p>
             <a:fld id="{E504D85E-2087-4C48-BE7E-1A197735EA07}" type="datetimeFigureOut">
               <a:rPr lang="en-US" smtClean="0"/>
-              <a:t>11/17/2017</a:t>
+              <a:t>2/23/18</a:t>
             </a:fld>
             <a:endParaRPr lang="en-US"/>
           </a:p>
@@ -3538,7 +3534,7 @@
           <a:p>
             <a:fld id="{E504D85E-2087-4C48-BE7E-1A197735EA07}" type="datetimeFigureOut">
               <a:rPr lang="en-US" smtClean="0"/>
-              <a:t>11/17/2017</a:t>
+              <a:t>2/23/18</a:t>
             </a:fld>
             <a:endParaRPr lang="en-US"/>
           </a:p>
@@ -5236,7 +5232,7 @@
                   <a:schemeClr val="tx1"/>
                 </a:solidFill>
               </a:rPr>
-              <a:t>Device</a:t>
+              <a:t>CO Device</a:t>
             </a:r>
           </a:p>
           <a:p>
@@ -6149,6 +6145,13 @@
             <a:r>
               <a:rPr lang="en-US" b="1" dirty="0"/>
               <a:t>final binary</a:t>
+            </a:r>
+          </a:p>
+          <a:p>
+            <a:pPr algn="ctr"/>
+            <a:r>
+              <a:rPr lang="en-US" b="1" dirty="0"/>
+              <a:t>(FF file)</a:t>
             </a:r>
           </a:p>
         </p:txBody>
@@ -6912,7 +6915,7 @@
         <p:spPr>
           <a:xfrm>
             <a:off x="7149295" y="420513"/>
-            <a:ext cx="1064522" cy="369332"/>
+            <a:ext cx="1064522" cy="646331"/>
           </a:xfrm>
           <a:prstGeom prst="rect">
             <a:avLst/>
@@ -6923,6 +6926,13 @@
             <a:spAutoFit/>
           </a:bodyPr>
           <a:lstStyle/>
+          <a:p>
+            <a:pPr algn="ctr"/>
+            <a:r>
+              <a:rPr lang="en-US" b="1" dirty="0"/>
+              <a:t>WA </a:t>
+            </a:r>
+          </a:p>
           <a:p>
             <a:pPr algn="ctr"/>
             <a:r>

</xml_diff>

<commit_message>
final minor changes by tball
</commit_message>
<xml_diff>
--- a/papers/lctes/diagrams.pptx
+++ b/papers/lctes/diagrams.pptx
@@ -130,6 +130,10 @@
 </p:cmAuthorLst>
 </file>
 
+<file path=ppt/revisionInfo.xml><?xml version="1.0" encoding="utf-8"?>
+<p1510:revInfo xmlns:a="http://schemas.openxmlformats.org/drawingml/2006/main" xmlns:r="http://schemas.openxmlformats.org/officeDocument/2006/relationships" xmlns:p1510="http://schemas.microsoft.com/office/powerpoint/2015/10/main"/>
+</file>
+
 <file path=ppt/notesMasters/notesMaster1.xml><?xml version="1.0" encoding="utf-8"?>
 <p:notesMaster xmlns:a="http://schemas.openxmlformats.org/drawingml/2006/main" xmlns:r="http://schemas.openxmlformats.org/officeDocument/2006/relationships" xmlns:p="http://schemas.openxmlformats.org/presentationml/2006/main">
   <p:cSld>
@@ -212,7 +216,7 @@
           <a:p>
             <a:fld id="{C0237B04-0BFF-4188-AE10-E77C3C5257C8}" type="datetimeFigureOut">
               <a:rPr lang="en-US" smtClean="0"/>
-              <a:t>4/13/18</a:t>
+              <a:t>5/3/2018</a:t>
             </a:fld>
             <a:endParaRPr lang="en-US"/>
           </a:p>
@@ -884,7 +888,7 @@
           <a:p>
             <a:fld id="{E504D85E-2087-4C48-BE7E-1A197735EA07}" type="datetimeFigureOut">
               <a:rPr lang="en-US" smtClean="0"/>
-              <a:t>4/13/18</a:t>
+              <a:t>5/3/2018</a:t>
             </a:fld>
             <a:endParaRPr lang="en-US"/>
           </a:p>
@@ -1082,7 +1086,7 @@
           <a:p>
             <a:fld id="{E504D85E-2087-4C48-BE7E-1A197735EA07}" type="datetimeFigureOut">
               <a:rPr lang="en-US" smtClean="0"/>
-              <a:t>4/13/18</a:t>
+              <a:t>5/3/2018</a:t>
             </a:fld>
             <a:endParaRPr lang="en-US"/>
           </a:p>
@@ -1290,7 +1294,7 @@
           <a:p>
             <a:fld id="{E504D85E-2087-4C48-BE7E-1A197735EA07}" type="datetimeFigureOut">
               <a:rPr lang="en-US" smtClean="0"/>
-              <a:t>4/13/18</a:t>
+              <a:t>5/3/2018</a:t>
             </a:fld>
             <a:endParaRPr lang="en-US"/>
           </a:p>
@@ -1488,7 +1492,7 @@
           <a:p>
             <a:fld id="{E504D85E-2087-4C48-BE7E-1A197735EA07}" type="datetimeFigureOut">
               <a:rPr lang="en-US" smtClean="0"/>
-              <a:t>4/13/18</a:t>
+              <a:t>5/3/2018</a:t>
             </a:fld>
             <a:endParaRPr lang="en-US"/>
           </a:p>
@@ -1763,7 +1767,7 @@
           <a:p>
             <a:fld id="{E504D85E-2087-4C48-BE7E-1A197735EA07}" type="datetimeFigureOut">
               <a:rPr lang="en-US" smtClean="0"/>
-              <a:t>4/13/18</a:t>
+              <a:t>5/3/2018</a:t>
             </a:fld>
             <a:endParaRPr lang="en-US"/>
           </a:p>
@@ -2028,7 +2032,7 @@
           <a:p>
             <a:fld id="{E504D85E-2087-4C48-BE7E-1A197735EA07}" type="datetimeFigureOut">
               <a:rPr lang="en-US" smtClean="0"/>
-              <a:t>4/13/18</a:t>
+              <a:t>5/3/2018</a:t>
             </a:fld>
             <a:endParaRPr lang="en-US"/>
           </a:p>
@@ -2440,7 +2444,7 @@
           <a:p>
             <a:fld id="{E504D85E-2087-4C48-BE7E-1A197735EA07}" type="datetimeFigureOut">
               <a:rPr lang="en-US" smtClean="0"/>
-              <a:t>4/13/18</a:t>
+              <a:t>5/3/2018</a:t>
             </a:fld>
             <a:endParaRPr lang="en-US"/>
           </a:p>
@@ -2581,7 +2585,7 @@
           <a:p>
             <a:fld id="{E504D85E-2087-4C48-BE7E-1A197735EA07}" type="datetimeFigureOut">
               <a:rPr lang="en-US" smtClean="0"/>
-              <a:t>4/13/18</a:t>
+              <a:t>5/3/2018</a:t>
             </a:fld>
             <a:endParaRPr lang="en-US"/>
           </a:p>
@@ -2694,7 +2698,7 @@
           <a:p>
             <a:fld id="{E504D85E-2087-4C48-BE7E-1A197735EA07}" type="datetimeFigureOut">
               <a:rPr lang="en-US" smtClean="0"/>
-              <a:t>4/13/18</a:t>
+              <a:t>5/3/2018</a:t>
             </a:fld>
             <a:endParaRPr lang="en-US"/>
           </a:p>
@@ -3005,7 +3009,7 @@
           <a:p>
             <a:fld id="{E504D85E-2087-4C48-BE7E-1A197735EA07}" type="datetimeFigureOut">
               <a:rPr lang="en-US" smtClean="0"/>
-              <a:t>4/13/18</a:t>
+              <a:t>5/3/2018</a:t>
             </a:fld>
             <a:endParaRPr lang="en-US"/>
           </a:p>
@@ -3293,7 +3297,7 @@
           <a:p>
             <a:fld id="{E504D85E-2087-4C48-BE7E-1A197735EA07}" type="datetimeFigureOut">
               <a:rPr lang="en-US" smtClean="0"/>
-              <a:t>4/13/18</a:t>
+              <a:t>5/3/2018</a:t>
             </a:fld>
             <a:endParaRPr lang="en-US"/>
           </a:p>
@@ -3534,7 +3538,7 @@
           <a:p>
             <a:fld id="{E504D85E-2087-4C48-BE7E-1A197735EA07}" type="datetimeFigureOut">
               <a:rPr lang="en-US" smtClean="0"/>
-              <a:t>4/13/18</a:t>
+              <a:t>5/3/2018</a:t>
             </a:fld>
             <a:endParaRPr lang="en-US"/>
           </a:p>
@@ -5227,20 +5231,12 @@
           <a:p>
             <a:pPr algn="ctr"/>
             <a:r>
-              <a:rPr lang="en-US" b="1" dirty="0" err="1">
-                <a:solidFill>
-                  <a:schemeClr val="tx1"/>
-                </a:solidFill>
-              </a:rPr>
-              <a:t>Codal</a:t>
-            </a:r>
-            <a:r>
               <a:rPr lang="en-US" b="1" dirty="0">
                 <a:solidFill>
                   <a:schemeClr val="tx1"/>
                 </a:solidFill>
               </a:rPr>
-              <a:t> Device</a:t>
+              <a:t>Device</a:t>
             </a:r>
           </a:p>
           <a:p>
@@ -5418,7 +5414,18 @@
                   <a:schemeClr val="tx1"/>
                 </a:solidFill>
               </a:rPr>
-              <a:t>C++</a:t>
+              <a:t>CODAL</a:t>
+            </a:r>
+          </a:p>
+          <a:p>
+            <a:pPr algn="ctr"/>
+            <a:r>
+              <a:rPr lang="en-US" dirty="0">
+                <a:solidFill>
+                  <a:schemeClr val="tx1"/>
+                </a:solidFill>
+              </a:rPr>
+              <a:t>(C++)</a:t>
             </a:r>
           </a:p>
         </p:txBody>

</xml_diff>